<commit_message>
Update PYTHON_11_Functions Part 2.pptx
</commit_message>
<xml_diff>
--- a/PYTHON_11_Functions Part 2.pptx
+++ b/PYTHON_11_Functions Part 2.pptx
@@ -34,7 +34,8 @@
     <p:sldId id="318" r:id="rId28"/>
     <p:sldId id="319" r:id="rId29"/>
     <p:sldId id="320" r:id="rId30"/>
-    <p:sldId id="291" r:id="rId31"/>
+    <p:sldId id="321" r:id="rId31"/>
+    <p:sldId id="291" r:id="rId32"/>
   </p:sldIdLst>
   <p:sldSz cx="12192000" cy="6858000"/>
   <p:notesSz cx="6858000" cy="9144000"/>
@@ -288,7 +289,7 @@
           <a:p>
             <a:fld id="{D3853345-A581-455E-9661-1270F4F6E587}" type="datetimeFigureOut">
               <a:rPr lang="en-US" smtClean="0"/>
-              <a:t>7/19/2019</a:t>
+              <a:t>7/21/2019</a:t>
             </a:fld>
             <a:endParaRPr lang="en-US" dirty="0"/>
           </a:p>
@@ -491,7 +492,7 @@
           <a:p>
             <a:fld id="{D3853345-A581-455E-9661-1270F4F6E587}" type="datetimeFigureOut">
               <a:rPr lang="en-US" smtClean="0"/>
-              <a:t>7/19/2019</a:t>
+              <a:t>7/21/2019</a:t>
             </a:fld>
             <a:endParaRPr lang="en-US" dirty="0"/>
           </a:p>
@@ -699,7 +700,7 @@
           <a:p>
             <a:fld id="{D3853345-A581-455E-9661-1270F4F6E587}" type="datetimeFigureOut">
               <a:rPr lang="en-US" smtClean="0"/>
-              <a:t>7/19/2019</a:t>
+              <a:t>7/21/2019</a:t>
             </a:fld>
             <a:endParaRPr lang="en-US" dirty="0"/>
           </a:p>
@@ -897,7 +898,7 @@
           <a:p>
             <a:fld id="{D3853345-A581-455E-9661-1270F4F6E587}" type="datetimeFigureOut">
               <a:rPr lang="en-US" smtClean="0"/>
-              <a:t>7/19/2019</a:t>
+              <a:t>7/21/2019</a:t>
             </a:fld>
             <a:endParaRPr lang="en-US" dirty="0"/>
           </a:p>
@@ -1172,7 +1173,7 @@
           <a:p>
             <a:fld id="{D3853345-A581-455E-9661-1270F4F6E587}" type="datetimeFigureOut">
               <a:rPr lang="en-US" smtClean="0"/>
-              <a:t>7/19/2019</a:t>
+              <a:t>7/21/2019</a:t>
             </a:fld>
             <a:endParaRPr lang="en-US" dirty="0"/>
           </a:p>
@@ -1437,7 +1438,7 @@
           <a:p>
             <a:fld id="{D3853345-A581-455E-9661-1270F4F6E587}" type="datetimeFigureOut">
               <a:rPr lang="en-US" smtClean="0"/>
-              <a:t>7/19/2019</a:t>
+              <a:t>7/21/2019</a:t>
             </a:fld>
             <a:endParaRPr lang="en-US" dirty="0"/>
           </a:p>
@@ -1849,7 +1850,7 @@
           <a:p>
             <a:fld id="{D3853345-A581-455E-9661-1270F4F6E587}" type="datetimeFigureOut">
               <a:rPr lang="en-US" smtClean="0"/>
-              <a:t>7/19/2019</a:t>
+              <a:t>7/21/2019</a:t>
             </a:fld>
             <a:endParaRPr lang="en-US" dirty="0"/>
           </a:p>
@@ -1990,7 +1991,7 @@
           <a:p>
             <a:fld id="{D3853345-A581-455E-9661-1270F4F6E587}" type="datetimeFigureOut">
               <a:rPr lang="en-US" smtClean="0"/>
-              <a:t>7/19/2019</a:t>
+              <a:t>7/21/2019</a:t>
             </a:fld>
             <a:endParaRPr lang="en-US" dirty="0"/>
           </a:p>
@@ -2103,7 +2104,7 @@
           <a:p>
             <a:fld id="{D3853345-A581-455E-9661-1270F4F6E587}" type="datetimeFigureOut">
               <a:rPr lang="en-US" smtClean="0"/>
-              <a:t>7/19/2019</a:t>
+              <a:t>7/21/2019</a:t>
             </a:fld>
             <a:endParaRPr lang="en-US" dirty="0"/>
           </a:p>
@@ -2419,7 +2420,7 @@
           <a:p>
             <a:fld id="{D3853345-A581-455E-9661-1270F4F6E587}" type="datetimeFigureOut">
               <a:rPr lang="en-US" smtClean="0"/>
-              <a:t>7/19/2019</a:t>
+              <a:t>7/21/2019</a:t>
             </a:fld>
             <a:endParaRPr lang="en-US" dirty="0"/>
           </a:p>
@@ -2712,7 +2713,7 @@
           <a:p>
             <a:fld id="{D3853345-A581-455E-9661-1270F4F6E587}" type="datetimeFigureOut">
               <a:rPr lang="en-US" smtClean="0"/>
-              <a:t>7/19/2019</a:t>
+              <a:t>7/21/2019</a:t>
             </a:fld>
             <a:endParaRPr lang="en-US" dirty="0"/>
           </a:p>
@@ -2953,7 +2954,7 @@
           <a:p>
             <a:fld id="{D3853345-A581-455E-9661-1270F4F6E587}" type="datetimeFigureOut">
               <a:rPr lang="en-US" smtClean="0"/>
-              <a:t>7/19/2019</a:t>
+              <a:t>7/21/2019</a:t>
             </a:fld>
             <a:endParaRPr lang="en-US" dirty="0"/>
           </a:p>
@@ -7164,15 +7165,39 @@
             </a:pPr>
             <a:r>
               <a:rPr lang="en-US" sz="3200" dirty="0"/>
-              <a:t>• Even though the parameter rate appears in both main() and </a:t>
-            </a:r>
-            <a:r>
-              <a:rPr lang="en-US" sz="3200" dirty="0" err="1"/>
+              <a:t>• Even though the parameter rate appears in both </a:t>
+            </a:r>
+            <a:r>
+              <a:rPr lang="en-US" sz="3200" dirty="0">
+                <a:solidFill>
+                  <a:srgbClr val="FF0000"/>
+                </a:solidFill>
+              </a:rPr>
+              <a:t>main() </a:t>
+            </a:r>
+            <a:r>
+              <a:rPr lang="en-US" sz="3200" dirty="0"/>
+              <a:t>and </a:t>
+            </a:r>
+            <a:r>
+              <a:rPr lang="en-US" sz="3200" dirty="0" err="1">
+                <a:solidFill>
+                  <a:srgbClr val="FF0000"/>
+                </a:solidFill>
+              </a:rPr>
               <a:t>addInterest</a:t>
             </a:r>
             <a:r>
-              <a:rPr lang="en-US" sz="3200" dirty="0"/>
-              <a:t>(), they are two separate variables because of scope</a:t>
+              <a:rPr lang="en-US" sz="3200" dirty="0">
+                <a:solidFill>
+                  <a:srgbClr val="FF0000"/>
+                </a:solidFill>
+              </a:rPr>
+              <a:t>()</a:t>
+            </a:r>
+            <a:r>
+              <a:rPr lang="en-US" sz="3200" dirty="0"/>
+              <a:t>, they are two separate variables because of scope</a:t>
             </a:r>
           </a:p>
           <a:p>
@@ -8050,6 +8075,140 @@
 </file>
 
 <file path=ppt/slides/slide30.xml><?xml version="1.0" encoding="utf-8"?>
+<p:sld xmlns:a="http://schemas.openxmlformats.org/drawingml/2006/main" xmlns:r="http://schemas.openxmlformats.org/officeDocument/2006/relationships" xmlns:p="http://schemas.openxmlformats.org/presentationml/2006/main">
+  <p:cSld>
+    <p:spTree>
+      <p:nvGrpSpPr>
+        <p:cNvPr id="1" name=""/>
+        <p:cNvGrpSpPr/>
+        <p:nvPr/>
+      </p:nvGrpSpPr>
+      <p:grpSpPr>
+        <a:xfrm>
+          <a:off x="0" y="0"/>
+          <a:ext cx="0" cy="0"/>
+          <a:chOff x="0" y="0"/>
+          <a:chExt cx="0" cy="0"/>
+        </a:xfrm>
+      </p:grpSpPr>
+      <p:sp>
+        <p:nvSpPr>
+          <p:cNvPr id="2" name="Title 1">
+            <a:extLst>
+              <a:ext uri="{FF2B5EF4-FFF2-40B4-BE49-F238E27FC236}">
+                <a16:creationId xmlns:a16="http://schemas.microsoft.com/office/drawing/2014/main" id="{F41D286E-6150-4877-BD37-B923BBE1CEB6}"/>
+              </a:ext>
+            </a:extLst>
+          </p:cNvPr>
+          <p:cNvSpPr>
+            <a:spLocks noGrp="1"/>
+          </p:cNvSpPr>
+          <p:nvPr>
+            <p:ph type="title"/>
+          </p:nvPr>
+        </p:nvSpPr>
+        <p:spPr/>
+        <p:txBody>
+          <a:bodyPr/>
+          <a:lstStyle/>
+          <a:p>
+            <a:r>
+              <a:rPr lang="en-US" b="1" dirty="0"/>
+              <a:t>Practice Questions </a:t>
+            </a:r>
+          </a:p>
+        </p:txBody>
+      </p:sp>
+      <p:sp>
+        <p:nvSpPr>
+          <p:cNvPr id="3" name="Content Placeholder 2">
+            <a:extLst>
+              <a:ext uri="{FF2B5EF4-FFF2-40B4-BE49-F238E27FC236}">
+                <a16:creationId xmlns:a16="http://schemas.microsoft.com/office/drawing/2014/main" id="{FD3FA829-5E25-4BB3-8359-31EB53738C82}"/>
+              </a:ext>
+            </a:extLst>
+          </p:cNvPr>
+          <p:cNvSpPr>
+            <a:spLocks noGrp="1"/>
+          </p:cNvSpPr>
+          <p:nvPr>
+            <p:ph idx="1"/>
+          </p:nvPr>
+        </p:nvSpPr>
+        <p:spPr/>
+        <p:txBody>
+          <a:bodyPr>
+            <a:normAutofit/>
+          </a:bodyPr>
+          <a:lstStyle/>
+          <a:p>
+            <a:r>
+              <a:rPr lang="en-US" sz="3200" dirty="0">
+                <a:solidFill>
+                  <a:srgbClr val="FF0000"/>
+                </a:solidFill>
+              </a:rPr>
+              <a:t>Write a function to add two numbers and return the sum.</a:t>
+            </a:r>
+          </a:p>
+          <a:p>
+            <a:r>
+              <a:rPr lang="en-US" sz="3200" dirty="0"/>
+              <a:t>Write a function to multiply two numbers and return the product.</a:t>
+            </a:r>
+          </a:p>
+          <a:p>
+            <a:r>
+              <a:rPr lang="en-US" sz="3200" dirty="0"/>
+              <a:t>Write a Python function to find the Max of two numbers. (</a:t>
+            </a:r>
+            <a:r>
+              <a:rPr lang="en-US" sz="3200" dirty="0">
+                <a:solidFill>
+                  <a:srgbClr val="00B050"/>
+                </a:solidFill>
+              </a:rPr>
+              <a:t>How do you make decisions in Python</a:t>
+            </a:r>
+            <a:r>
+              <a:rPr lang="en-US" sz="3200" dirty="0"/>
+              <a:t>)</a:t>
+            </a:r>
+          </a:p>
+          <a:p>
+            <a:r>
+              <a:rPr lang="en-US" sz="3200" dirty="0"/>
+              <a:t>Write a function to print the sum of 100 numbers. (</a:t>
+            </a:r>
+            <a:r>
+              <a:rPr lang="en-US" sz="3200" dirty="0">
+                <a:solidFill>
+                  <a:srgbClr val="00B050"/>
+                </a:solidFill>
+              </a:rPr>
+              <a:t>Use while loop</a:t>
+            </a:r>
+            <a:r>
+              <a:rPr lang="en-US" sz="3200" dirty="0"/>
+              <a:t>)</a:t>
+            </a:r>
+          </a:p>
+        </p:txBody>
+      </p:sp>
+    </p:spTree>
+    <p:extLst>
+      <p:ext uri="{BB962C8B-B14F-4D97-AF65-F5344CB8AC3E}">
+        <p14:creationId xmlns:p14="http://schemas.microsoft.com/office/powerpoint/2010/main" val="3409087861"/>
+      </p:ext>
+    </p:extLst>
+  </p:cSld>
+  <p:clrMapOvr>
+    <a:masterClrMapping/>
+  </p:clrMapOvr>
+</p:sld>
+</file>
+
+<file path=ppt/slides/slide31.xml><?xml version="1.0" encoding="utf-8"?>
 <p:sld xmlns:a="http://schemas.openxmlformats.org/drawingml/2006/main" xmlns:r="http://schemas.openxmlformats.org/officeDocument/2006/relationships" xmlns:p="http://schemas.openxmlformats.org/presentationml/2006/main">
   <p:cSld>
     <p:spTree>

</xml_diff>